<commit_message>
Updated supporting documents details
</commit_message>
<xml_diff>
--- a/Documents/Slides/Supporting Documents.pptx
+++ b/Documents/Slides/Supporting Documents.pptx
@@ -4,17 +4,21 @@
   <p:sldMasterIdLst>
     <p:sldMasterId id="2147483648" r:id="rId1"/>
   </p:sldMasterIdLst>
+  <p:notesMasterIdLst>
+    <p:notesMasterId r:id="rId13"/>
+  </p:notesMasterIdLst>
   <p:sldIdLst>
     <p:sldId id="256" r:id="rId2"/>
     <p:sldId id="257" r:id="rId3"/>
-    <p:sldId id="258" r:id="rId4"/>
-    <p:sldId id="259" r:id="rId5"/>
-    <p:sldId id="260" r:id="rId6"/>
-    <p:sldId id="261" r:id="rId7"/>
-    <p:sldId id="262" r:id="rId8"/>
-    <p:sldId id="263" r:id="rId9"/>
-    <p:sldId id="264" r:id="rId10"/>
-    <p:sldId id="265" r:id="rId11"/>
+    <p:sldId id="266" r:id="rId4"/>
+    <p:sldId id="258" r:id="rId5"/>
+    <p:sldId id="259" r:id="rId6"/>
+    <p:sldId id="260" r:id="rId7"/>
+    <p:sldId id="261" r:id="rId8"/>
+    <p:sldId id="262" r:id="rId9"/>
+    <p:sldId id="263" r:id="rId10"/>
+    <p:sldId id="264" r:id="rId11"/>
+    <p:sldId id="265" r:id="rId12"/>
   </p:sldIdLst>
   <p:sldSz cx="12192000" cy="6858000"/>
   <p:notesSz cx="6858000" cy="9144000"/>
@@ -113,7 +117,458 @@
       </a:defRPr>
     </a:lvl9pPr>
   </p:defaultTextStyle>
+  <p:extLst>
+    <p:ext uri="{EFAFB233-063F-42B5-8137-9DF3F51BA10A}">
+      <p15:sldGuideLst xmlns:p15="http://schemas.microsoft.com/office/powerpoint/2012/main"/>
+    </p:ext>
+  </p:extLst>
 </p:presentation>
+</file>
+
+<file path=ppt/notesMasters/notesMaster1.xml><?xml version="1.0" encoding="utf-8"?>
+<p:notesMaster xmlns:a="http://schemas.openxmlformats.org/drawingml/2006/main" xmlns:r="http://schemas.openxmlformats.org/officeDocument/2006/relationships" xmlns:p="http://schemas.openxmlformats.org/presentationml/2006/main">
+  <p:cSld>
+    <p:bg>
+      <p:bgRef idx="1001">
+        <a:schemeClr val="bg1"/>
+      </p:bgRef>
+    </p:bg>
+    <p:spTree>
+      <p:nvGrpSpPr>
+        <p:cNvPr id="1" name=""/>
+        <p:cNvGrpSpPr/>
+        <p:nvPr/>
+      </p:nvGrpSpPr>
+      <p:grpSpPr>
+        <a:xfrm>
+          <a:off x="0" y="0"/>
+          <a:ext cx="0" cy="0"/>
+          <a:chOff x="0" y="0"/>
+          <a:chExt cx="0" cy="0"/>
+        </a:xfrm>
+      </p:grpSpPr>
+      <p:sp>
+        <p:nvSpPr>
+          <p:cNvPr id="2" name="Header Placeholder 1"/>
+          <p:cNvSpPr>
+            <a:spLocks noGrp="1"/>
+          </p:cNvSpPr>
+          <p:nvPr>
+            <p:ph type="hdr" sz="quarter"/>
+          </p:nvPr>
+        </p:nvSpPr>
+        <p:spPr>
+          <a:xfrm>
+            <a:off x="0" y="0"/>
+            <a:ext cx="2971800" cy="458788"/>
+          </a:xfrm>
+          <a:prstGeom prst="rect">
+            <a:avLst/>
+          </a:prstGeom>
+        </p:spPr>
+        <p:txBody>
+          <a:bodyPr vert="horz" lIns="91440" tIns="45720" rIns="91440" bIns="45720" rtlCol="0"/>
+          <a:lstStyle>
+            <a:lvl1pPr algn="l">
+              <a:defRPr sz="1200"/>
+            </a:lvl1pPr>
+          </a:lstStyle>
+          <a:p>
+            <a:endParaRPr lang="en-US"/>
+          </a:p>
+        </p:txBody>
+      </p:sp>
+      <p:sp>
+        <p:nvSpPr>
+          <p:cNvPr id="3" name="Date Placeholder 2"/>
+          <p:cNvSpPr>
+            <a:spLocks noGrp="1"/>
+          </p:cNvSpPr>
+          <p:nvPr>
+            <p:ph type="dt" idx="1"/>
+          </p:nvPr>
+        </p:nvSpPr>
+        <p:spPr>
+          <a:xfrm>
+            <a:off x="3884613" y="0"/>
+            <a:ext cx="2971800" cy="458788"/>
+          </a:xfrm>
+          <a:prstGeom prst="rect">
+            <a:avLst/>
+          </a:prstGeom>
+        </p:spPr>
+        <p:txBody>
+          <a:bodyPr vert="horz" lIns="91440" tIns="45720" rIns="91440" bIns="45720" rtlCol="0"/>
+          <a:lstStyle>
+            <a:lvl1pPr algn="r">
+              <a:defRPr sz="1200"/>
+            </a:lvl1pPr>
+          </a:lstStyle>
+          <a:p>
+            <a:fld id="{756DA466-3E39-7C42-9C2B-51003122F33D}" type="datetimeFigureOut">
+              <a:rPr lang="en-US" smtClean="0"/>
+              <a:t>6/27/25</a:t>
+            </a:fld>
+            <a:endParaRPr lang="en-US"/>
+          </a:p>
+        </p:txBody>
+      </p:sp>
+      <p:sp>
+        <p:nvSpPr>
+          <p:cNvPr id="4" name="Slide Image Placeholder 3"/>
+          <p:cNvSpPr>
+            <a:spLocks noGrp="1" noRot="1" noChangeAspect="1"/>
+          </p:cNvSpPr>
+          <p:nvPr>
+            <p:ph type="sldImg" idx="2"/>
+          </p:nvPr>
+        </p:nvSpPr>
+        <p:spPr>
+          <a:xfrm>
+            <a:off x="685800" y="1143000"/>
+            <a:ext cx="5486400" cy="3086100"/>
+          </a:xfrm>
+          <a:prstGeom prst="rect">
+            <a:avLst/>
+          </a:prstGeom>
+          <a:noFill/>
+          <a:ln w="12700">
+            <a:solidFill>
+              <a:prstClr val="black"/>
+            </a:solidFill>
+          </a:ln>
+        </p:spPr>
+        <p:txBody>
+          <a:bodyPr vert="horz" lIns="91440" tIns="45720" rIns="91440" bIns="45720" rtlCol="0" anchor="ctr"/>
+          <a:lstStyle/>
+          <a:p>
+            <a:endParaRPr lang="en-US"/>
+          </a:p>
+        </p:txBody>
+      </p:sp>
+      <p:sp>
+        <p:nvSpPr>
+          <p:cNvPr id="5" name="Notes Placeholder 4"/>
+          <p:cNvSpPr>
+            <a:spLocks noGrp="1"/>
+          </p:cNvSpPr>
+          <p:nvPr>
+            <p:ph type="body" sz="quarter" idx="3"/>
+          </p:nvPr>
+        </p:nvSpPr>
+        <p:spPr>
+          <a:xfrm>
+            <a:off x="685800" y="4400550"/>
+            <a:ext cx="5486400" cy="3600450"/>
+          </a:xfrm>
+          <a:prstGeom prst="rect">
+            <a:avLst/>
+          </a:prstGeom>
+        </p:spPr>
+        <p:txBody>
+          <a:bodyPr vert="horz" lIns="91440" tIns="45720" rIns="91440" bIns="45720" rtlCol="0"/>
+          <a:lstStyle/>
+          <a:p>
+            <a:pPr lvl="0"/>
+            <a:r>
+              <a:rPr lang="en-US"/>
+              <a:t>Click to edit Master text styles</a:t>
+            </a:r>
+          </a:p>
+          <a:p>
+            <a:pPr lvl="1"/>
+            <a:r>
+              <a:rPr lang="en-US"/>
+              <a:t>Second level</a:t>
+            </a:r>
+          </a:p>
+          <a:p>
+            <a:pPr lvl="2"/>
+            <a:r>
+              <a:rPr lang="en-US"/>
+              <a:t>Third level</a:t>
+            </a:r>
+          </a:p>
+          <a:p>
+            <a:pPr lvl="3"/>
+            <a:r>
+              <a:rPr lang="en-US"/>
+              <a:t>Fourth level</a:t>
+            </a:r>
+          </a:p>
+          <a:p>
+            <a:pPr lvl="4"/>
+            <a:r>
+              <a:rPr lang="en-US"/>
+              <a:t>Fifth level</a:t>
+            </a:r>
+          </a:p>
+        </p:txBody>
+      </p:sp>
+      <p:sp>
+        <p:nvSpPr>
+          <p:cNvPr id="6" name="Footer Placeholder 5"/>
+          <p:cNvSpPr>
+            <a:spLocks noGrp="1"/>
+          </p:cNvSpPr>
+          <p:nvPr>
+            <p:ph type="ftr" sz="quarter" idx="4"/>
+          </p:nvPr>
+        </p:nvSpPr>
+        <p:spPr>
+          <a:xfrm>
+            <a:off x="0" y="8685213"/>
+            <a:ext cx="2971800" cy="458787"/>
+          </a:xfrm>
+          <a:prstGeom prst="rect">
+            <a:avLst/>
+          </a:prstGeom>
+        </p:spPr>
+        <p:txBody>
+          <a:bodyPr vert="horz" lIns="91440" tIns="45720" rIns="91440" bIns="45720" rtlCol="0" anchor="b"/>
+          <a:lstStyle>
+            <a:lvl1pPr algn="l">
+              <a:defRPr sz="1200"/>
+            </a:lvl1pPr>
+          </a:lstStyle>
+          <a:p>
+            <a:endParaRPr lang="en-US"/>
+          </a:p>
+        </p:txBody>
+      </p:sp>
+      <p:sp>
+        <p:nvSpPr>
+          <p:cNvPr id="7" name="Slide Number Placeholder 6"/>
+          <p:cNvSpPr>
+            <a:spLocks noGrp="1"/>
+          </p:cNvSpPr>
+          <p:nvPr>
+            <p:ph type="sldNum" sz="quarter" idx="5"/>
+          </p:nvPr>
+        </p:nvSpPr>
+        <p:spPr>
+          <a:xfrm>
+            <a:off x="3884613" y="8685213"/>
+            <a:ext cx="2971800" cy="458787"/>
+          </a:xfrm>
+          <a:prstGeom prst="rect">
+            <a:avLst/>
+          </a:prstGeom>
+        </p:spPr>
+        <p:txBody>
+          <a:bodyPr vert="horz" lIns="91440" tIns="45720" rIns="91440" bIns="45720" rtlCol="0" anchor="b"/>
+          <a:lstStyle>
+            <a:lvl1pPr algn="r">
+              <a:defRPr sz="1200"/>
+            </a:lvl1pPr>
+          </a:lstStyle>
+          <a:p>
+            <a:fld id="{F99B32C7-C91B-8049-88F1-D3F1CD5EBBC9}" type="slidenum">
+              <a:rPr lang="en-US" smtClean="0"/>
+              <a:t>‹#›</a:t>
+            </a:fld>
+            <a:endParaRPr lang="en-US"/>
+          </a:p>
+        </p:txBody>
+      </p:sp>
+    </p:spTree>
+    <p:extLst>
+      <p:ext uri="{BB962C8B-B14F-4D97-AF65-F5344CB8AC3E}">
+        <p14:creationId xmlns:p14="http://schemas.microsoft.com/office/powerpoint/2010/main" val="4010359666"/>
+      </p:ext>
+    </p:extLst>
+  </p:cSld>
+  <p:clrMap bg1="lt1" tx1="dk1" bg2="lt2" tx2="dk2" accent1="accent1" accent2="accent2" accent3="accent3" accent4="accent4" accent5="accent5" accent6="accent6" hlink="hlink" folHlink="folHlink"/>
+  <p:notesStyle>
+    <a:lvl1pPr marL="0" algn="l" defTabSz="914400" rtl="0" eaLnBrk="1" latinLnBrk="0" hangingPunct="1">
+      <a:defRPr sz="1200" kern="1200">
+        <a:solidFill>
+          <a:schemeClr val="tx1"/>
+        </a:solidFill>
+        <a:latin typeface="+mn-lt"/>
+        <a:ea typeface="+mn-ea"/>
+        <a:cs typeface="+mn-cs"/>
+      </a:defRPr>
+    </a:lvl1pPr>
+    <a:lvl2pPr marL="457200" algn="l" defTabSz="914400" rtl="0" eaLnBrk="1" latinLnBrk="0" hangingPunct="1">
+      <a:defRPr sz="1200" kern="1200">
+        <a:solidFill>
+          <a:schemeClr val="tx1"/>
+        </a:solidFill>
+        <a:latin typeface="+mn-lt"/>
+        <a:ea typeface="+mn-ea"/>
+        <a:cs typeface="+mn-cs"/>
+      </a:defRPr>
+    </a:lvl2pPr>
+    <a:lvl3pPr marL="914400" algn="l" defTabSz="914400" rtl="0" eaLnBrk="1" latinLnBrk="0" hangingPunct="1">
+      <a:defRPr sz="1200" kern="1200">
+        <a:solidFill>
+          <a:schemeClr val="tx1"/>
+        </a:solidFill>
+        <a:latin typeface="+mn-lt"/>
+        <a:ea typeface="+mn-ea"/>
+        <a:cs typeface="+mn-cs"/>
+      </a:defRPr>
+    </a:lvl3pPr>
+    <a:lvl4pPr marL="1371600" algn="l" defTabSz="914400" rtl="0" eaLnBrk="1" latinLnBrk="0" hangingPunct="1">
+      <a:defRPr sz="1200" kern="1200">
+        <a:solidFill>
+          <a:schemeClr val="tx1"/>
+        </a:solidFill>
+        <a:latin typeface="+mn-lt"/>
+        <a:ea typeface="+mn-ea"/>
+        <a:cs typeface="+mn-cs"/>
+      </a:defRPr>
+    </a:lvl4pPr>
+    <a:lvl5pPr marL="1828800" algn="l" defTabSz="914400" rtl="0" eaLnBrk="1" latinLnBrk="0" hangingPunct="1">
+      <a:defRPr sz="1200" kern="1200">
+        <a:solidFill>
+          <a:schemeClr val="tx1"/>
+        </a:solidFill>
+        <a:latin typeface="+mn-lt"/>
+        <a:ea typeface="+mn-ea"/>
+        <a:cs typeface="+mn-cs"/>
+      </a:defRPr>
+    </a:lvl5pPr>
+    <a:lvl6pPr marL="2286000" algn="l" defTabSz="914400" rtl="0" eaLnBrk="1" latinLnBrk="0" hangingPunct="1">
+      <a:defRPr sz="1200" kern="1200">
+        <a:solidFill>
+          <a:schemeClr val="tx1"/>
+        </a:solidFill>
+        <a:latin typeface="+mn-lt"/>
+        <a:ea typeface="+mn-ea"/>
+        <a:cs typeface="+mn-cs"/>
+      </a:defRPr>
+    </a:lvl6pPr>
+    <a:lvl7pPr marL="2743200" algn="l" defTabSz="914400" rtl="0" eaLnBrk="1" latinLnBrk="0" hangingPunct="1">
+      <a:defRPr sz="1200" kern="1200">
+        <a:solidFill>
+          <a:schemeClr val="tx1"/>
+        </a:solidFill>
+        <a:latin typeface="+mn-lt"/>
+        <a:ea typeface="+mn-ea"/>
+        <a:cs typeface="+mn-cs"/>
+      </a:defRPr>
+    </a:lvl7pPr>
+    <a:lvl8pPr marL="3200400" algn="l" defTabSz="914400" rtl="0" eaLnBrk="1" latinLnBrk="0" hangingPunct="1">
+      <a:defRPr sz="1200" kern="1200">
+        <a:solidFill>
+          <a:schemeClr val="tx1"/>
+        </a:solidFill>
+        <a:latin typeface="+mn-lt"/>
+        <a:ea typeface="+mn-ea"/>
+        <a:cs typeface="+mn-cs"/>
+      </a:defRPr>
+    </a:lvl8pPr>
+    <a:lvl9pPr marL="3657600" algn="l" defTabSz="914400" rtl="0" eaLnBrk="1" latinLnBrk="0" hangingPunct="1">
+      <a:defRPr sz="1200" kern="1200">
+        <a:solidFill>
+          <a:schemeClr val="tx1"/>
+        </a:solidFill>
+        <a:latin typeface="+mn-lt"/>
+        <a:ea typeface="+mn-ea"/>
+        <a:cs typeface="+mn-cs"/>
+      </a:defRPr>
+    </a:lvl9pPr>
+  </p:notesStyle>
+</p:notesMaster>
+</file>
+
+<file path=ppt/notesSlides/notesSlide1.xml><?xml version="1.0" encoding="utf-8"?>
+<p:notes xmlns:a="http://schemas.openxmlformats.org/drawingml/2006/main" xmlns:r="http://schemas.openxmlformats.org/officeDocument/2006/relationships" xmlns:p="http://schemas.openxmlformats.org/presentationml/2006/main">
+  <p:cSld>
+    <p:spTree>
+      <p:nvGrpSpPr>
+        <p:cNvPr id="1" name=""/>
+        <p:cNvGrpSpPr/>
+        <p:nvPr/>
+      </p:nvGrpSpPr>
+      <p:grpSpPr>
+        <a:xfrm>
+          <a:off x="0" y="0"/>
+          <a:ext cx="0" cy="0"/>
+          <a:chOff x="0" y="0"/>
+          <a:chExt cx="0" cy="0"/>
+        </a:xfrm>
+      </p:grpSpPr>
+      <p:sp>
+        <p:nvSpPr>
+          <p:cNvPr id="2" name="Slide Image Placeholder 1"/>
+          <p:cNvSpPr>
+            <a:spLocks noGrp="1" noRot="1" noChangeAspect="1"/>
+          </p:cNvSpPr>
+          <p:nvPr>
+            <p:ph type="sldImg"/>
+          </p:nvPr>
+        </p:nvSpPr>
+        <p:spPr/>
+      </p:sp>
+      <p:sp>
+        <p:nvSpPr>
+          <p:cNvPr id="3" name="Notes Placeholder 2"/>
+          <p:cNvSpPr>
+            <a:spLocks noGrp="1"/>
+          </p:cNvSpPr>
+          <p:nvPr>
+            <p:ph type="body" idx="1"/>
+          </p:nvPr>
+        </p:nvSpPr>
+        <p:spPr/>
+        <p:txBody>
+          <a:bodyPr/>
+          <a:lstStyle/>
+          <a:p>
+            <a:r>
+              <a:rPr lang="en-US" dirty="0"/>
+              <a:t>check for letter from program if this is needed</a:t>
+            </a:r>
+            <a:br>
+              <a:rPr lang="en-US" dirty="0"/>
+            </a:br>
+            <a:br>
+              <a:rPr lang="en-US" dirty="0"/>
+            </a:br>
+            <a:r>
+              <a:rPr lang="en-US" dirty="0"/>
+              <a:t>write something about letters difference between LOR and LOS and sponsors statements</a:t>
+            </a:r>
+          </a:p>
+        </p:txBody>
+      </p:sp>
+      <p:sp>
+        <p:nvSpPr>
+          <p:cNvPr id="4" name="Slide Number Placeholder 3"/>
+          <p:cNvSpPr>
+            <a:spLocks noGrp="1"/>
+          </p:cNvSpPr>
+          <p:nvPr>
+            <p:ph type="sldNum" sz="quarter" idx="5"/>
+          </p:nvPr>
+        </p:nvSpPr>
+        <p:spPr/>
+        <p:txBody>
+          <a:bodyPr/>
+          <a:lstStyle/>
+          <a:p>
+            <a:fld id="{F99B32C7-C91B-8049-88F1-D3F1CD5EBBC9}" type="slidenum">
+              <a:rPr lang="en-US" smtClean="0"/>
+              <a:t>1</a:t>
+            </a:fld>
+            <a:endParaRPr lang="en-US"/>
+          </a:p>
+        </p:txBody>
+      </p:sp>
+    </p:spTree>
+    <p:extLst>
+      <p:ext uri="{BB962C8B-B14F-4D97-AF65-F5344CB8AC3E}">
+        <p14:creationId xmlns:p14="http://schemas.microsoft.com/office/powerpoint/2010/main" val="1569363559"/>
+      </p:ext>
+    </p:extLst>
+  </p:cSld>
+  <p:clrMapOvr>
+    <a:masterClrMapping/>
+  </p:clrMapOvr>
+</p:notes>
 </file>
 
 <file path=ppt/slideLayouts/slideLayout1.xml><?xml version="1.0" encoding="utf-8"?>
@@ -263,7 +718,7 @@
           <a:p>
             <a:fld id="{D8C6A2C2-2D2C-B444-807A-9C9FDFFA3422}" type="datetimeFigureOut">
               <a:rPr lang="en-US" smtClean="0"/>
-              <a:t>6/26/25</a:t>
+              <a:t>6/27/25</a:t>
             </a:fld>
             <a:endParaRPr lang="en-US"/>
           </a:p>
@@ -461,7 +916,7 @@
           <a:p>
             <a:fld id="{D8C6A2C2-2D2C-B444-807A-9C9FDFFA3422}" type="datetimeFigureOut">
               <a:rPr lang="en-US" smtClean="0"/>
-              <a:t>6/26/25</a:t>
+              <a:t>6/27/25</a:t>
             </a:fld>
             <a:endParaRPr lang="en-US"/>
           </a:p>
@@ -669,7 +1124,7 @@
           <a:p>
             <a:fld id="{D8C6A2C2-2D2C-B444-807A-9C9FDFFA3422}" type="datetimeFigureOut">
               <a:rPr lang="en-US" smtClean="0"/>
-              <a:t>6/26/25</a:t>
+              <a:t>6/27/25</a:t>
             </a:fld>
             <a:endParaRPr lang="en-US"/>
           </a:p>
@@ -867,7 +1322,7 @@
           <a:p>
             <a:fld id="{D8C6A2C2-2D2C-B444-807A-9C9FDFFA3422}" type="datetimeFigureOut">
               <a:rPr lang="en-US" smtClean="0"/>
-              <a:t>6/26/25</a:t>
+              <a:t>6/27/25</a:t>
             </a:fld>
             <a:endParaRPr lang="en-US"/>
           </a:p>
@@ -1142,7 +1597,7 @@
           <a:p>
             <a:fld id="{D8C6A2C2-2D2C-B444-807A-9C9FDFFA3422}" type="datetimeFigureOut">
               <a:rPr lang="en-US" smtClean="0"/>
-              <a:t>6/26/25</a:t>
+              <a:t>6/27/25</a:t>
             </a:fld>
             <a:endParaRPr lang="en-US"/>
           </a:p>
@@ -1407,7 +1862,7 @@
           <a:p>
             <a:fld id="{D8C6A2C2-2D2C-B444-807A-9C9FDFFA3422}" type="datetimeFigureOut">
               <a:rPr lang="en-US" smtClean="0"/>
-              <a:t>6/26/25</a:t>
+              <a:t>6/27/25</a:t>
             </a:fld>
             <a:endParaRPr lang="en-US"/>
           </a:p>
@@ -1819,7 +2274,7 @@
           <a:p>
             <a:fld id="{D8C6A2C2-2D2C-B444-807A-9C9FDFFA3422}" type="datetimeFigureOut">
               <a:rPr lang="en-US" smtClean="0"/>
-              <a:t>6/26/25</a:t>
+              <a:t>6/27/25</a:t>
             </a:fld>
             <a:endParaRPr lang="en-US"/>
           </a:p>
@@ -1960,7 +2415,7 @@
           <a:p>
             <a:fld id="{D8C6A2C2-2D2C-B444-807A-9C9FDFFA3422}" type="datetimeFigureOut">
               <a:rPr lang="en-US" smtClean="0"/>
-              <a:t>6/26/25</a:t>
+              <a:t>6/27/25</a:t>
             </a:fld>
             <a:endParaRPr lang="en-US"/>
           </a:p>
@@ -2073,7 +2528,7 @@
           <a:p>
             <a:fld id="{D8C6A2C2-2D2C-B444-807A-9C9FDFFA3422}" type="datetimeFigureOut">
               <a:rPr lang="en-US" smtClean="0"/>
-              <a:t>6/26/25</a:t>
+              <a:t>6/27/25</a:t>
             </a:fld>
             <a:endParaRPr lang="en-US"/>
           </a:p>
@@ -2384,7 +2839,7 @@
           <a:p>
             <a:fld id="{D8C6A2C2-2D2C-B444-807A-9C9FDFFA3422}" type="datetimeFigureOut">
               <a:rPr lang="en-US" smtClean="0"/>
-              <a:t>6/26/25</a:t>
+              <a:t>6/27/25</a:t>
             </a:fld>
             <a:endParaRPr lang="en-US"/>
           </a:p>
@@ -2672,7 +3127,7 @@
           <a:p>
             <a:fld id="{D8C6A2C2-2D2C-B444-807A-9C9FDFFA3422}" type="datetimeFigureOut">
               <a:rPr lang="en-US" smtClean="0"/>
-              <a:t>6/26/25</a:t>
+              <a:t>6/27/25</a:t>
             </a:fld>
             <a:endParaRPr lang="en-US"/>
           </a:p>
@@ -2913,7 +3368,7 @@
           <a:p>
             <a:fld id="{D8C6A2C2-2D2C-B444-807A-9C9FDFFA3422}" type="datetimeFigureOut">
               <a:rPr lang="en-US" smtClean="0"/>
-              <a:t>6/26/25</a:t>
+              <a:t>6/27/25</a:t>
             </a:fld>
             <a:endParaRPr lang="en-US"/>
           </a:p>
@@ -3418,6 +3873,131 @@
           <p:cNvPr id="2" name="Title 1">
             <a:extLst>
               <a:ext uri="{FF2B5EF4-FFF2-40B4-BE49-F238E27FC236}">
+                <a16:creationId xmlns:a16="http://schemas.microsoft.com/office/drawing/2014/main" id="{CD000CD2-8F33-03D2-EE83-6248C6D215F6}"/>
+              </a:ext>
+            </a:extLst>
+          </p:cNvPr>
+          <p:cNvSpPr>
+            <a:spLocks noGrp="1"/>
+          </p:cNvSpPr>
+          <p:nvPr>
+            <p:ph type="title"/>
+          </p:nvPr>
+        </p:nvSpPr>
+        <p:spPr/>
+        <p:txBody>
+          <a:bodyPr/>
+          <a:lstStyle/>
+          <a:p>
+            <a:r>
+              <a:rPr lang="en-US" dirty="0"/>
+              <a:t>After the Discussion</a:t>
+            </a:r>
+          </a:p>
+        </p:txBody>
+      </p:sp>
+      <p:sp>
+        <p:nvSpPr>
+          <p:cNvPr id="3" name="Content Placeholder 2">
+            <a:extLst>
+              <a:ext uri="{FF2B5EF4-FFF2-40B4-BE49-F238E27FC236}">
+                <a16:creationId xmlns:a16="http://schemas.microsoft.com/office/drawing/2014/main" id="{96ABFE7C-5D5D-715A-4373-9D592BF61F4B}"/>
+              </a:ext>
+            </a:extLst>
+          </p:cNvPr>
+          <p:cNvSpPr>
+            <a:spLocks noGrp="1"/>
+          </p:cNvSpPr>
+          <p:nvPr>
+            <p:ph idx="1"/>
+          </p:nvPr>
+        </p:nvSpPr>
+        <p:spPr/>
+        <p:txBody>
+          <a:bodyPr/>
+          <a:lstStyle/>
+          <a:p>
+            <a:r>
+              <a:rPr lang="en-US" dirty="0"/>
+              <a:t>Reviewers strongly encouraged to update critiques</a:t>
+            </a:r>
+          </a:p>
+          <a:p>
+            <a:r>
+              <a:rPr lang="en-US" dirty="0"/>
+              <a:t>You will get a score between 10 (all 1s) and 90 (all 9s)</a:t>
+            </a:r>
+          </a:p>
+          <a:p>
+            <a:r>
+              <a:rPr lang="en-US" dirty="0"/>
+              <a:t>A couple weeks later you will get the written critiques</a:t>
+            </a:r>
+          </a:p>
+          <a:p>
+            <a:r>
+              <a:rPr lang="en-US" dirty="0"/>
+              <a:t>Current paylines not available, generally &lt;30 or &lt;30</a:t>
+            </a:r>
+            <a:r>
+              <a:rPr lang="en-US" baseline="30000" dirty="0"/>
+              <a:t>th</a:t>
+            </a:r>
+            <a:r>
+              <a:rPr lang="en-US" dirty="0"/>
+              <a:t> percentile</a:t>
+            </a:r>
+          </a:p>
+          <a:p>
+            <a:pPr lvl="1"/>
+            <a:r>
+              <a:rPr lang="en-US" dirty="0"/>
+              <a:t>Usually, institutes publish these, currently not available</a:t>
+            </a:r>
+          </a:p>
+          <a:p>
+            <a:r>
+              <a:rPr lang="en-US" dirty="0"/>
+              <a:t>Your PO may ask for clarifications or a response to critiques</a:t>
+            </a:r>
+          </a:p>
+        </p:txBody>
+      </p:sp>
+    </p:spTree>
+    <p:extLst>
+      <p:ext uri="{BB962C8B-B14F-4D97-AF65-F5344CB8AC3E}">
+        <p14:creationId xmlns:p14="http://schemas.microsoft.com/office/powerpoint/2010/main" val="31329508"/>
+      </p:ext>
+    </p:extLst>
+  </p:cSld>
+  <p:clrMapOvr>
+    <a:masterClrMapping/>
+  </p:clrMapOvr>
+</p:sld>
+</file>
+
+<file path=ppt/slides/slide11.xml><?xml version="1.0" encoding="utf-8"?>
+<p:sld xmlns:a="http://schemas.openxmlformats.org/drawingml/2006/main" xmlns:r="http://schemas.openxmlformats.org/officeDocument/2006/relationships" xmlns:p="http://schemas.openxmlformats.org/presentationml/2006/main">
+  <p:cSld>
+    <p:spTree>
+      <p:nvGrpSpPr>
+        <p:cNvPr id="1" name=""/>
+        <p:cNvGrpSpPr/>
+        <p:nvPr/>
+      </p:nvGrpSpPr>
+      <p:grpSpPr>
+        <a:xfrm>
+          <a:off x="0" y="0"/>
+          <a:ext cx="0" cy="0"/>
+          <a:chOff x="0" y="0"/>
+          <a:chExt cx="0" cy="0"/>
+        </a:xfrm>
+      </p:grpSpPr>
+      <p:sp>
+        <p:nvSpPr>
+          <p:cNvPr id="2" name="Title 1">
+            <a:extLst>
+              <a:ext uri="{FF2B5EF4-FFF2-40B4-BE49-F238E27FC236}">
                 <a16:creationId xmlns:a16="http://schemas.microsoft.com/office/drawing/2014/main" id="{286D2B06-4009-60CA-57FE-147F800AF2EC}"/>
               </a:ext>
             </a:extLst>
@@ -3471,7 +4051,7 @@
             <a:pPr lvl="1"/>
             <a:r>
               <a:rPr lang="en-US" dirty="0"/>
-              <a:t>Ill assign each of you two applications</a:t>
+              <a:t>I will assign each of you two applications</a:t>
             </a:r>
           </a:p>
           <a:p>
@@ -3519,7 +4099,7 @@
           <a:p>
             <a:r>
               <a:rPr lang="en-US" dirty="0"/>
-              <a:t>Also revise your aim/research strategy based on today’s discussion</a:t>
+              <a:t>Please revise your aim/research strategy based on today’s discussion</a:t>
             </a:r>
             <a:br>
               <a:rPr lang="en-US" dirty="0"/>
@@ -3675,7 +4255,7 @@
           <p:cNvPr id="2" name="Title 1">
             <a:extLst>
               <a:ext uri="{FF2B5EF4-FFF2-40B4-BE49-F238E27FC236}">
-                <a16:creationId xmlns:a16="http://schemas.microsoft.com/office/drawing/2014/main" id="{AA7685D8-6324-4390-BC42-C4A79FCF4734}"/>
+                <a16:creationId xmlns:a16="http://schemas.microsoft.com/office/drawing/2014/main" id="{FC92A36E-1BB8-5E97-B1F5-11E05C7AD8CD}"/>
               </a:ext>
             </a:extLst>
           </p:cNvPr>
@@ -3693,7 +4273,7 @@
           <a:p>
             <a:r>
               <a:rPr lang="en-US" dirty="0"/>
-              <a:t>Supporting Documents</a:t>
+              <a:t>Key Information</a:t>
             </a:r>
           </a:p>
         </p:txBody>
@@ -3703,67 +4283,82 @@
           <p:cNvPr id="3" name="Content Placeholder 2">
             <a:extLst>
               <a:ext uri="{FF2B5EF4-FFF2-40B4-BE49-F238E27FC236}">
-                <a16:creationId xmlns:a16="http://schemas.microsoft.com/office/drawing/2014/main" id="{E97707E0-3F2F-421C-D3EE-3AA653896D52}"/>
-              </a:ext>
-            </a:extLst>
-          </p:cNvPr>
-          <p:cNvSpPr>
-            <a:spLocks noGrp="1"/>
-          </p:cNvSpPr>
-          <p:nvPr>
-            <p:ph idx="1"/>
-          </p:nvPr>
-        </p:nvSpPr>
-        <p:spPr/>
-        <p:txBody>
-          <a:bodyPr/>
-          <a:lstStyle/>
-          <a:p>
-            <a:r>
-              <a:rPr lang="en-US" dirty="0"/>
-              <a:t>Facilities</a:t>
-            </a:r>
-          </a:p>
-          <a:p>
-            <a:r>
-              <a:rPr lang="en-US" dirty="0"/>
-              <a:t>Key equipment</a:t>
-            </a:r>
-          </a:p>
-          <a:p>
-            <a:r>
-              <a:rPr lang="en-US" dirty="0"/>
-              <a:t>Training in Responsible Conduct of Research</a:t>
-            </a:r>
-          </a:p>
-          <a:p>
-            <a:r>
-              <a:rPr lang="en-US" dirty="0"/>
-              <a:t>Authentication of Key Resources</a:t>
-            </a:r>
-          </a:p>
-          <a:p>
-            <a:r>
-              <a:rPr lang="en-US" dirty="0"/>
-              <a:t>Resource Sharing Plans</a:t>
-            </a:r>
-          </a:p>
-          <a:p>
-            <a:r>
-              <a:rPr lang="en-US" dirty="0"/>
-              <a:t>Protections for Human Subjects </a:t>
-            </a:r>
-          </a:p>
-          <a:p>
-            <a:r>
-              <a:rPr lang="en-US" dirty="0"/>
-              <a:t>Vertebrate Animals</a:t>
-            </a:r>
-          </a:p>
-          <a:p>
-            <a:r>
-              <a:rPr lang="en-US" dirty="0"/>
-              <a:t>Biohazards (Tamoxifen, Lentivirus, not AAV)</a:t>
+                <a16:creationId xmlns:a16="http://schemas.microsoft.com/office/drawing/2014/main" id="{9AF3D422-23A3-4542-FB83-7CFA4B2C77FB}"/>
+              </a:ext>
+            </a:extLst>
+          </p:cNvPr>
+          <p:cNvSpPr>
+            <a:spLocks noGrp="1"/>
+          </p:cNvSpPr>
+          <p:nvPr>
+            <p:ph sz="half" idx="1"/>
+          </p:nvPr>
+        </p:nvSpPr>
+        <p:spPr>
+          <a:xfrm>
+            <a:off x="838200" y="1825625"/>
+            <a:ext cx="5562600" cy="4351338"/>
+          </a:xfrm>
+        </p:spPr>
+        <p:txBody>
+          <a:bodyPr>
+            <a:normAutofit fontScale="92500" lnSpcReduction="20000"/>
+          </a:bodyPr>
+          <a:lstStyle/>
+          <a:p>
+            <a:r>
+              <a:rPr lang="en-US" dirty="0"/>
+              <a:t>What is the health problem</a:t>
+            </a:r>
+          </a:p>
+          <a:p>
+            <a:r>
+              <a:rPr lang="en-US" dirty="0"/>
+              <a:t>What do we know, what is the gap</a:t>
+            </a:r>
+          </a:p>
+          <a:p>
+            <a:r>
+              <a:rPr lang="en-US" dirty="0"/>
+              <a:t>What is the long term goal</a:t>
+            </a:r>
+          </a:p>
+          <a:p>
+            <a:r>
+              <a:rPr lang="en-US" dirty="0"/>
+              <a:t>What is the central objective</a:t>
+            </a:r>
+          </a:p>
+          <a:p>
+            <a:pPr lvl="1"/>
+            <a:r>
+              <a:rPr lang="en-US" dirty="0"/>
+              <a:t>Is it a step towards the long term goal</a:t>
+            </a:r>
+          </a:p>
+          <a:p>
+            <a:r>
+              <a:rPr lang="en-US" dirty="0"/>
+              <a:t>What is the central hypothesis</a:t>
+            </a:r>
+          </a:p>
+          <a:p>
+            <a:pPr lvl="1"/>
+            <a:r>
+              <a:rPr lang="en-US" dirty="0"/>
+              <a:t>Does that hypothesis, once tested, accomplish that goal</a:t>
+            </a:r>
+          </a:p>
+          <a:p>
+            <a:r>
+              <a:rPr lang="en-US" dirty="0"/>
+              <a:t>Are the aims related to the central hypothesis</a:t>
+            </a:r>
+          </a:p>
+          <a:p>
+            <a:r>
+              <a:rPr lang="en-US" dirty="0"/>
+              <a:t>What is the payoff (relate to health problem)</a:t>
             </a:r>
           </a:p>
           <a:p>
@@ -3771,10 +4366,42 @@
           </a:p>
         </p:txBody>
       </p:sp>
+      <p:pic>
+        <p:nvPicPr>
+          <p:cNvPr id="5" name="Content Placeholder 4">
+            <a:extLst>
+              <a:ext uri="{FF2B5EF4-FFF2-40B4-BE49-F238E27FC236}">
+                <a16:creationId xmlns:a16="http://schemas.microsoft.com/office/drawing/2014/main" id="{64D0B058-6DD7-ACEE-2127-059FB7AC99AC}"/>
+              </a:ext>
+            </a:extLst>
+          </p:cNvPr>
+          <p:cNvPicPr>
+            <a:picLocks noGrp="1" noChangeAspect="1"/>
+          </p:cNvPicPr>
+          <p:nvPr>
+            <p:ph sz="half" idx="2"/>
+          </p:nvPr>
+        </p:nvPicPr>
+        <p:blipFill>
+          <a:blip r:embed="rId2"/>
+          <a:stretch>
+            <a:fillRect/>
+          </a:stretch>
+        </p:blipFill>
+        <p:spPr>
+          <a:xfrm>
+            <a:off x="7020995" y="1825625"/>
+            <a:ext cx="3484010" cy="4351338"/>
+          </a:xfrm>
+          <a:prstGeom prst="rect">
+            <a:avLst/>
+          </a:prstGeom>
+        </p:spPr>
+      </p:pic>
     </p:spTree>
     <p:extLst>
       <p:ext uri="{BB962C8B-B14F-4D97-AF65-F5344CB8AC3E}">
-        <p14:creationId xmlns:p14="http://schemas.microsoft.com/office/powerpoint/2010/main" val="582038309"/>
+        <p14:creationId xmlns:p14="http://schemas.microsoft.com/office/powerpoint/2010/main" val="335854400"/>
       </p:ext>
     </p:extLst>
   </p:cSld>
@@ -3806,7 +4433,7 @@
           <p:cNvPr id="2" name="Title 1">
             <a:extLst>
               <a:ext uri="{FF2B5EF4-FFF2-40B4-BE49-F238E27FC236}">
-                <a16:creationId xmlns:a16="http://schemas.microsoft.com/office/drawing/2014/main" id="{520F2073-7FC0-8000-AF52-21F6C3E2B6F4}"/>
+                <a16:creationId xmlns:a16="http://schemas.microsoft.com/office/drawing/2014/main" id="{AA7685D8-6324-4390-BC42-C4A79FCF4734}"/>
               </a:ext>
             </a:extLst>
           </p:cNvPr>
@@ -3824,107 +4451,139 @@
           <a:p>
             <a:r>
               <a:rPr lang="en-US" dirty="0"/>
+              <a:t>Supporting Documents</a:t>
+            </a:r>
+          </a:p>
+        </p:txBody>
+      </p:sp>
+      <p:sp>
+        <p:nvSpPr>
+          <p:cNvPr id="3" name="Content Placeholder 2">
+            <a:extLst>
+              <a:ext uri="{FF2B5EF4-FFF2-40B4-BE49-F238E27FC236}">
+                <a16:creationId xmlns:a16="http://schemas.microsoft.com/office/drawing/2014/main" id="{E97707E0-3F2F-421C-D3EE-3AA653896D52}"/>
+              </a:ext>
+            </a:extLst>
+          </p:cNvPr>
+          <p:cNvSpPr>
+            <a:spLocks noGrp="1"/>
+          </p:cNvSpPr>
+          <p:nvPr>
+            <p:ph idx="1"/>
+          </p:nvPr>
+        </p:nvSpPr>
+        <p:spPr/>
+        <p:txBody>
+          <a:bodyPr/>
+          <a:lstStyle/>
+          <a:p>
+            <a:r>
+              <a:rPr lang="en-US" dirty="0"/>
+              <a:t>Facilities</a:t>
+            </a:r>
+          </a:p>
+          <a:p>
+            <a:r>
+              <a:rPr lang="en-US" dirty="0"/>
+              <a:t>Key equipment</a:t>
+            </a:r>
+          </a:p>
+          <a:p>
+            <a:r>
+              <a:rPr lang="en-US" dirty="0"/>
               <a:t>Training in Responsible Conduct of Research</a:t>
             </a:r>
           </a:p>
-        </p:txBody>
-      </p:sp>
-      <p:sp>
-        <p:nvSpPr>
-          <p:cNvPr id="3" name="Content Placeholder 2">
-            <a:extLst>
-              <a:ext uri="{FF2B5EF4-FFF2-40B4-BE49-F238E27FC236}">
-                <a16:creationId xmlns:a16="http://schemas.microsoft.com/office/drawing/2014/main" id="{661921C6-A00A-038C-1A5B-457820129144}"/>
-              </a:ext>
-            </a:extLst>
-          </p:cNvPr>
-          <p:cNvSpPr>
-            <a:spLocks noGrp="1"/>
-          </p:cNvSpPr>
-          <p:nvPr>
-            <p:ph idx="1"/>
-          </p:nvPr>
-        </p:nvSpPr>
-        <p:spPr/>
-        <p:txBody>
-          <a:bodyPr>
-            <a:normAutofit/>
+          <a:p>
+            <a:r>
+              <a:rPr lang="en-US" dirty="0">
+                <a:solidFill>
+                  <a:schemeClr val="accent2"/>
+                </a:solidFill>
+              </a:rPr>
+              <a:t>Authentication of Key Resources</a:t>
+            </a:r>
+          </a:p>
+          <a:p>
+            <a:r>
+              <a:rPr lang="en-US" dirty="0">
+                <a:solidFill>
+                  <a:schemeClr val="accent2"/>
+                </a:solidFill>
+              </a:rPr>
+              <a:t>Resource Sharing Plans</a:t>
+            </a:r>
+          </a:p>
+          <a:p>
+            <a:r>
+              <a:rPr lang="en-US" dirty="0">
+                <a:solidFill>
+                  <a:schemeClr val="accent2"/>
+                </a:solidFill>
+              </a:rPr>
+              <a:t>Protections for Human Subjects </a:t>
+            </a:r>
+          </a:p>
+          <a:p>
+            <a:r>
+              <a:rPr lang="en-US" dirty="0">
+                <a:solidFill>
+                  <a:schemeClr val="accent2"/>
+                </a:solidFill>
+              </a:rPr>
+              <a:t>Vertebrate Animals</a:t>
+            </a:r>
+          </a:p>
+          <a:p>
+            <a:r>
+              <a:rPr lang="en-US" dirty="0">
+                <a:solidFill>
+                  <a:schemeClr val="accent2"/>
+                </a:solidFill>
+              </a:rPr>
+              <a:t>Biohazards (Tamoxifen, Lentivirus, not AAV)</a:t>
+            </a:r>
+          </a:p>
+          <a:p>
+            <a:endParaRPr lang="en-US" dirty="0"/>
+          </a:p>
+        </p:txBody>
+      </p:sp>
+      <p:sp>
+        <p:nvSpPr>
+          <p:cNvPr id="4" name="TextBox 3">
+            <a:extLst>
+              <a:ext uri="{FF2B5EF4-FFF2-40B4-BE49-F238E27FC236}">
+                <a16:creationId xmlns:a16="http://schemas.microsoft.com/office/drawing/2014/main" id="{106AC869-C0C1-8E4E-CC83-20A7DBC137C1}"/>
+              </a:ext>
+            </a:extLst>
+          </p:cNvPr>
+          <p:cNvSpPr txBox="1"/>
+          <p:nvPr/>
+        </p:nvSpPr>
+        <p:spPr>
+          <a:xfrm>
+            <a:off x="10163102" y="6239785"/>
+            <a:ext cx="1773114" cy="369332"/>
+          </a:xfrm>
+          <a:prstGeom prst="rect">
+            <a:avLst/>
+          </a:prstGeom>
+          <a:noFill/>
+        </p:spPr>
+        <p:txBody>
+          <a:bodyPr wrap="none" rtlCol="0">
+            <a:spAutoFit/>
           </a:bodyPr>
           <a:lstStyle/>
           <a:p>
-            <a:pPr marL="0" indent="0">
-              <a:buNone/>
-            </a:pPr>
-            <a:r>
-              <a:rPr lang="en-US" dirty="0"/>
-              <a:t>1) </a:t>
-            </a:r>
-            <a:r>
-              <a:rPr lang="en-US" b="1" i="1" dirty="0"/>
-              <a:t>Format -</a:t>
-            </a:r>
-            <a:r>
-              <a:rPr lang="en-US" dirty="0"/>
-              <a:t> the required format of instruction</a:t>
-            </a:r>
-          </a:p>
-          <a:p>
-            <a:pPr marL="0" indent="0">
-              <a:buNone/>
-            </a:pPr>
-            <a:r>
-              <a:rPr lang="en-US" dirty="0"/>
-              <a:t>2) </a:t>
-            </a:r>
-            <a:r>
-              <a:rPr lang="en-US" b="1" i="1" dirty="0"/>
-              <a:t>Subject Matter -</a:t>
-            </a:r>
-            <a:r>
-              <a:rPr lang="en-US" dirty="0"/>
-              <a:t> the breadth of subject matter</a:t>
-            </a:r>
-          </a:p>
-          <a:p>
-            <a:pPr marL="0" indent="0">
-              <a:buNone/>
-            </a:pPr>
-            <a:r>
-              <a:rPr lang="en-US" dirty="0"/>
-              <a:t>3) </a:t>
-            </a:r>
-            <a:r>
-              <a:rPr lang="en-US" b="1" i="1" dirty="0"/>
-              <a:t>Faculty Participation -</a:t>
-            </a:r>
-            <a:r>
-              <a:rPr lang="en-US" dirty="0"/>
-              <a:t> the role of the sponsor(s) and other faculty involvement in the fellow’s instruction; </a:t>
-            </a:r>
-          </a:p>
-          <a:p>
-            <a:pPr marL="0" indent="0">
-              <a:buNone/>
-            </a:pPr>
-            <a:r>
-              <a:rPr lang="en-US" dirty="0"/>
-              <a:t>4) </a:t>
-            </a:r>
-            <a:r>
-              <a:rPr lang="en-US" b="1" i="1" dirty="0"/>
-              <a:t>Duration of Instruction -</a:t>
-            </a:r>
-            <a:r>
-              <a:rPr lang="en-US" dirty="0"/>
-              <a:t> the number of contact hours of instruction (at least eight contact hours are required); and 5) </a:t>
-            </a:r>
-            <a:r>
-              <a:rPr lang="en-US" b="1" i="1" dirty="0"/>
-              <a:t>Frequency of Instruction – </a:t>
-            </a:r>
-            <a:r>
-              <a:rPr lang="en-US" dirty="0"/>
-              <a:t>instruction must occur during each career stage and at least once every four years. </a:t>
+            <a:r>
+              <a:rPr lang="en-US" dirty="0">
+                <a:solidFill>
+                  <a:schemeClr val="accent2"/>
+                </a:solidFill>
+              </a:rPr>
+              <a:t>May be required</a:t>
             </a:r>
           </a:p>
         </p:txBody>
@@ -3932,7 +4591,7 @@
     </p:spTree>
     <p:extLst>
       <p:ext uri="{BB962C8B-B14F-4D97-AF65-F5344CB8AC3E}">
-        <p14:creationId xmlns:p14="http://schemas.microsoft.com/office/powerpoint/2010/main" val="3757371789"/>
+        <p14:creationId xmlns:p14="http://schemas.microsoft.com/office/powerpoint/2010/main" val="582038309"/>
       </p:ext>
     </p:extLst>
   </p:cSld>
@@ -3961,10 +4620,10 @@
       </p:grpSpPr>
       <p:sp>
         <p:nvSpPr>
-          <p:cNvPr id="4" name="Title 3">
-            <a:extLst>
-              <a:ext uri="{FF2B5EF4-FFF2-40B4-BE49-F238E27FC236}">
-                <a16:creationId xmlns:a16="http://schemas.microsoft.com/office/drawing/2014/main" id="{523E5423-1D4C-C03C-FCF3-49E78C233785}"/>
+          <p:cNvPr id="2" name="Title 1">
+            <a:extLst>
+              <a:ext uri="{FF2B5EF4-FFF2-40B4-BE49-F238E27FC236}">
+                <a16:creationId xmlns:a16="http://schemas.microsoft.com/office/drawing/2014/main" id="{520F2073-7FC0-8000-AF52-21F6C3E2B6F4}"/>
               </a:ext>
             </a:extLst>
           </p:cNvPr>
@@ -3982,40 +4641,115 @@
           <a:p>
             <a:r>
               <a:rPr lang="en-US" dirty="0"/>
-              <a:t>The NIH Review Process</a:t>
-            </a:r>
-          </a:p>
-        </p:txBody>
-      </p:sp>
-      <p:sp>
-        <p:nvSpPr>
-          <p:cNvPr id="5" name="Text Placeholder 4">
-            <a:extLst>
-              <a:ext uri="{FF2B5EF4-FFF2-40B4-BE49-F238E27FC236}">
-                <a16:creationId xmlns:a16="http://schemas.microsoft.com/office/drawing/2014/main" id="{146CF3E4-8474-0F9D-B1EB-DB15AAEC5809}"/>
-              </a:ext>
-            </a:extLst>
-          </p:cNvPr>
-          <p:cNvSpPr>
-            <a:spLocks noGrp="1"/>
-          </p:cNvSpPr>
-          <p:nvPr>
-            <p:ph type="body" idx="1"/>
-          </p:nvPr>
-        </p:nvSpPr>
-        <p:spPr/>
-        <p:txBody>
-          <a:bodyPr/>
-          <a:lstStyle/>
-          <a:p>
-            <a:endParaRPr lang="en-US"/>
+              <a:t>Training in Responsible Conduct of Research</a:t>
+            </a:r>
+          </a:p>
+        </p:txBody>
+      </p:sp>
+      <p:sp>
+        <p:nvSpPr>
+          <p:cNvPr id="3" name="Content Placeholder 2">
+            <a:extLst>
+              <a:ext uri="{FF2B5EF4-FFF2-40B4-BE49-F238E27FC236}">
+                <a16:creationId xmlns:a16="http://schemas.microsoft.com/office/drawing/2014/main" id="{661921C6-A00A-038C-1A5B-457820129144}"/>
+              </a:ext>
+            </a:extLst>
+          </p:cNvPr>
+          <p:cNvSpPr>
+            <a:spLocks noGrp="1"/>
+          </p:cNvSpPr>
+          <p:nvPr>
+            <p:ph idx="1"/>
+          </p:nvPr>
+        </p:nvSpPr>
+        <p:spPr/>
+        <p:txBody>
+          <a:bodyPr>
+            <a:normAutofit/>
+          </a:bodyPr>
+          <a:lstStyle/>
+          <a:p>
+            <a:pPr marL="0" indent="0">
+              <a:buNone/>
+            </a:pPr>
+            <a:r>
+              <a:rPr lang="en-US" dirty="0"/>
+              <a:t>1) </a:t>
+            </a:r>
+            <a:r>
+              <a:rPr lang="en-US" b="1" i="1" dirty="0"/>
+              <a:t>Format -</a:t>
+            </a:r>
+            <a:r>
+              <a:rPr lang="en-US" dirty="0"/>
+              <a:t> the required format of instruction</a:t>
+            </a:r>
+          </a:p>
+          <a:p>
+            <a:pPr marL="0" indent="0">
+              <a:buNone/>
+            </a:pPr>
+            <a:r>
+              <a:rPr lang="en-US" dirty="0"/>
+              <a:t>2) </a:t>
+            </a:r>
+            <a:r>
+              <a:rPr lang="en-US" b="1" i="1" dirty="0"/>
+              <a:t>Subject Matter -</a:t>
+            </a:r>
+            <a:r>
+              <a:rPr lang="en-US" dirty="0"/>
+              <a:t> the breadth of subject matter</a:t>
+            </a:r>
+          </a:p>
+          <a:p>
+            <a:pPr marL="0" indent="0">
+              <a:buNone/>
+            </a:pPr>
+            <a:r>
+              <a:rPr lang="en-US" dirty="0"/>
+              <a:t>3) </a:t>
+            </a:r>
+            <a:r>
+              <a:rPr lang="en-US" b="1" i="1" dirty="0"/>
+              <a:t>Faculty Participation -</a:t>
+            </a:r>
+            <a:r>
+              <a:rPr lang="en-US" dirty="0"/>
+              <a:t> the role of the sponsor(s) and other faculty involvement in the fellow’s instruction; </a:t>
+            </a:r>
+          </a:p>
+          <a:p>
+            <a:pPr marL="0" indent="0">
+              <a:buNone/>
+            </a:pPr>
+            <a:r>
+              <a:rPr lang="en-US" dirty="0"/>
+              <a:t>4) </a:t>
+            </a:r>
+            <a:r>
+              <a:rPr lang="en-US" b="1" i="1" dirty="0"/>
+              <a:t>Duration of Instruction -</a:t>
+            </a:r>
+            <a:r>
+              <a:rPr lang="en-US" dirty="0"/>
+              <a:t> the number of contact hours of instruction (at least eight contact hours are required); and 5) </a:t>
+            </a:r>
+            <a:r>
+              <a:rPr lang="en-US" b="1" i="1" dirty="0"/>
+              <a:t>Frequency of Instruction – </a:t>
+            </a:r>
+            <a:r>
+              <a:rPr lang="en-US" dirty="0"/>
+              <a:t>instruction must occur during each career stage and at least once every four years. </a:t>
+            </a:r>
           </a:p>
         </p:txBody>
       </p:sp>
     </p:spTree>
     <p:extLst>
       <p:ext uri="{BB962C8B-B14F-4D97-AF65-F5344CB8AC3E}">
-        <p14:creationId xmlns:p14="http://schemas.microsoft.com/office/powerpoint/2010/main" val="3157671410"/>
+        <p14:creationId xmlns:p14="http://schemas.microsoft.com/office/powerpoint/2010/main" val="3757371789"/>
       </p:ext>
     </p:extLst>
   </p:cSld>
@@ -4047,7 +4781,7 @@
           <p:cNvPr id="4" name="Title 3">
             <a:extLst>
               <a:ext uri="{FF2B5EF4-FFF2-40B4-BE49-F238E27FC236}">
-                <a16:creationId xmlns:a16="http://schemas.microsoft.com/office/drawing/2014/main" id="{50B87B70-27D5-2115-C784-421957C21080}"/>
+                <a16:creationId xmlns:a16="http://schemas.microsoft.com/office/drawing/2014/main" id="{523E5423-1D4C-C03C-FCF3-49E78C233785}"/>
               </a:ext>
             </a:extLst>
           </p:cNvPr>
@@ -4065,70 +4799,40 @@
           <a:p>
             <a:r>
               <a:rPr lang="en-US" dirty="0"/>
-              <a:t>Two Stages</a:t>
-            </a:r>
-          </a:p>
-        </p:txBody>
-      </p:sp>
-      <p:sp>
-        <p:nvSpPr>
-          <p:cNvPr id="5" name="Content Placeholder 4">
-            <a:extLst>
-              <a:ext uri="{FF2B5EF4-FFF2-40B4-BE49-F238E27FC236}">
-                <a16:creationId xmlns:a16="http://schemas.microsoft.com/office/drawing/2014/main" id="{138CEC3A-12EE-BA33-B00E-537F9226AF31}"/>
-              </a:ext>
-            </a:extLst>
-          </p:cNvPr>
-          <p:cNvSpPr>
-            <a:spLocks noGrp="1"/>
-          </p:cNvSpPr>
-          <p:nvPr>
-            <p:ph idx="1"/>
-          </p:nvPr>
-        </p:nvSpPr>
-        <p:spPr/>
-        <p:txBody>
-          <a:bodyPr/>
-          <a:lstStyle/>
-          <a:p>
-            <a:r>
-              <a:rPr lang="en-US" dirty="0"/>
-              <a:t>During Study Section</a:t>
-            </a:r>
-          </a:p>
-          <a:p>
-            <a:pPr lvl="1"/>
-            <a:r>
-              <a:rPr lang="en-US" dirty="0"/>
-              <a:t>Preliminary Review (Scored)</a:t>
-            </a:r>
-          </a:p>
-          <a:p>
-            <a:pPr lvl="1"/>
-            <a:r>
-              <a:rPr lang="en-US" dirty="0"/>
-              <a:t>Discussion</a:t>
-            </a:r>
-          </a:p>
-          <a:p>
-            <a:pPr lvl="1"/>
-            <a:r>
-              <a:rPr lang="en-US" dirty="0"/>
-              <a:t>Restating Scores</a:t>
-            </a:r>
-          </a:p>
-          <a:p>
-            <a:r>
-              <a:rPr lang="en-US" dirty="0"/>
-              <a:t>Separate Council Makes Funding Decisions</a:t>
-            </a:r>
+              <a:t>The NIH Review Process</a:t>
+            </a:r>
+          </a:p>
+        </p:txBody>
+      </p:sp>
+      <p:sp>
+        <p:nvSpPr>
+          <p:cNvPr id="5" name="Text Placeholder 4">
+            <a:extLst>
+              <a:ext uri="{FF2B5EF4-FFF2-40B4-BE49-F238E27FC236}">
+                <a16:creationId xmlns:a16="http://schemas.microsoft.com/office/drawing/2014/main" id="{146CF3E4-8474-0F9D-B1EB-DB15AAEC5809}"/>
+              </a:ext>
+            </a:extLst>
+          </p:cNvPr>
+          <p:cNvSpPr>
+            <a:spLocks noGrp="1"/>
+          </p:cNvSpPr>
+          <p:nvPr>
+            <p:ph type="body" idx="1"/>
+          </p:nvPr>
+        </p:nvSpPr>
+        <p:spPr/>
+        <p:txBody>
+          <a:bodyPr/>
+          <a:lstStyle/>
+          <a:p>
+            <a:endParaRPr lang="en-US"/>
           </a:p>
         </p:txBody>
       </p:sp>
     </p:spTree>
     <p:extLst>
       <p:ext uri="{BB962C8B-B14F-4D97-AF65-F5344CB8AC3E}">
-        <p14:creationId xmlns:p14="http://schemas.microsoft.com/office/powerpoint/2010/main" val="235171135"/>
+        <p14:creationId xmlns:p14="http://schemas.microsoft.com/office/powerpoint/2010/main" val="3157671410"/>
       </p:ext>
     </p:extLst>
   </p:cSld>
@@ -4157,10 +4861,10 @@
       </p:grpSpPr>
       <p:sp>
         <p:nvSpPr>
-          <p:cNvPr id="2" name="Title 1">
-            <a:extLst>
-              <a:ext uri="{FF2B5EF4-FFF2-40B4-BE49-F238E27FC236}">
-                <a16:creationId xmlns:a16="http://schemas.microsoft.com/office/drawing/2014/main" id="{7FDC10C1-7202-EA06-08A1-B8DEE9F0122F}"/>
+          <p:cNvPr id="4" name="Title 3">
+            <a:extLst>
+              <a:ext uri="{FF2B5EF4-FFF2-40B4-BE49-F238E27FC236}">
+                <a16:creationId xmlns:a16="http://schemas.microsoft.com/office/drawing/2014/main" id="{50B87B70-27D5-2115-C784-421957C21080}"/>
               </a:ext>
             </a:extLst>
           </p:cNvPr>
@@ -4178,115 +4882,62 @@
           <a:p>
             <a:r>
               <a:rPr lang="en-US" dirty="0"/>
-              <a:t>Preliminary Review</a:t>
-            </a:r>
-          </a:p>
-        </p:txBody>
-      </p:sp>
-      <p:pic>
-        <p:nvPicPr>
+              <a:t>Two Stages</a:t>
+            </a:r>
+          </a:p>
+        </p:txBody>
+      </p:sp>
+      <p:sp>
+        <p:nvSpPr>
           <p:cNvPr id="5" name="Content Placeholder 4">
             <a:extLst>
               <a:ext uri="{FF2B5EF4-FFF2-40B4-BE49-F238E27FC236}">
-                <a16:creationId xmlns:a16="http://schemas.microsoft.com/office/drawing/2014/main" id="{1613FE4D-9E1A-B777-C4E7-44AD04E00A2D}"/>
-              </a:ext>
-            </a:extLst>
-          </p:cNvPr>
-          <p:cNvPicPr>
-            <a:picLocks noGrp="1" noChangeAspect="1"/>
-          </p:cNvPicPr>
-          <p:nvPr>
-            <p:ph sz="half" idx="1"/>
-          </p:nvPr>
-        </p:nvPicPr>
-        <p:blipFill>
-          <a:blip r:embed="rId2"/>
-          <a:stretch>
-            <a:fillRect/>
-          </a:stretch>
-        </p:blipFill>
-        <p:spPr>
-          <a:xfrm>
-            <a:off x="1320422" y="1825625"/>
-            <a:ext cx="4217155" cy="4351338"/>
-          </a:xfrm>
-        </p:spPr>
-      </p:pic>
-      <p:sp>
-        <p:nvSpPr>
-          <p:cNvPr id="9" name="Content Placeholder 8">
-            <a:extLst>
-              <a:ext uri="{FF2B5EF4-FFF2-40B4-BE49-F238E27FC236}">
-                <a16:creationId xmlns:a16="http://schemas.microsoft.com/office/drawing/2014/main" id="{3D370E9D-6F84-AE4E-D4AB-A3C02A6D5835}"/>
-              </a:ext>
-            </a:extLst>
-          </p:cNvPr>
-          <p:cNvSpPr>
-            <a:spLocks noGrp="1"/>
-          </p:cNvSpPr>
-          <p:nvPr>
-            <p:ph sz="half" idx="2"/>
-          </p:nvPr>
-        </p:nvSpPr>
-        <p:spPr/>
-        <p:txBody>
-          <a:bodyPr>
-            <a:normAutofit fontScale="92500" lnSpcReduction="20000"/>
-          </a:bodyPr>
-          <a:lstStyle/>
-          <a:p>
-            <a:r>
-              <a:rPr lang="en-US" dirty="0"/>
-              <a:t>Will be given score between 1 (excellent) and 9 on three categories</a:t>
-            </a:r>
-          </a:p>
-          <a:p>
-            <a:r>
-              <a:rPr lang="en-US" dirty="0"/>
-              <a:t>Overall score</a:t>
-            </a:r>
-          </a:p>
-          <a:p>
-            <a:r>
-              <a:rPr lang="en-US" dirty="0"/>
-              <a:t>Triage process</a:t>
-            </a:r>
-          </a:p>
-          <a:p>
-            <a:endParaRPr lang="en-US" dirty="0"/>
-          </a:p>
-          <a:p>
-            <a:r>
-              <a:rPr lang="en-US" dirty="0"/>
-              <a:t>Not scored</a:t>
+                <a16:creationId xmlns:a16="http://schemas.microsoft.com/office/drawing/2014/main" id="{138CEC3A-12EE-BA33-B00E-537F9226AF31}"/>
+              </a:ext>
+            </a:extLst>
+          </p:cNvPr>
+          <p:cNvSpPr>
+            <a:spLocks noGrp="1"/>
+          </p:cNvSpPr>
+          <p:nvPr>
+            <p:ph idx="1"/>
+          </p:nvPr>
+        </p:nvSpPr>
+        <p:spPr/>
+        <p:txBody>
+          <a:bodyPr/>
+          <a:lstStyle/>
+          <a:p>
+            <a:r>
+              <a:rPr lang="en-US" dirty="0"/>
+              <a:t>During Study Section</a:t>
             </a:r>
           </a:p>
           <a:p>
             <a:pPr lvl="1"/>
             <a:r>
               <a:rPr lang="en-US" dirty="0"/>
-              <a:t>RCRS</a:t>
+              <a:t>Preliminary Review (Scored)</a:t>
             </a:r>
           </a:p>
           <a:p>
             <a:pPr lvl="1"/>
             <a:r>
               <a:rPr lang="en-US" dirty="0"/>
-              <a:t>Human subjects, vertebrate animals</a:t>
+              <a:t>Discussion</a:t>
             </a:r>
           </a:p>
           <a:p>
             <a:pPr lvl="1"/>
             <a:r>
               <a:rPr lang="en-US" dirty="0"/>
-              <a:t>Budget</a:t>
-            </a:r>
-          </a:p>
-          <a:p>
-            <a:pPr lvl="1"/>
-            <a:r>
-              <a:rPr lang="en-US" dirty="0"/>
-              <a:t>Resource sharing</a:t>
+              <a:t>Restating Scores</a:t>
+            </a:r>
+          </a:p>
+          <a:p>
+            <a:r>
+              <a:rPr lang="en-US" dirty="0"/>
+              <a:t>Separate Council Makes Funding Decisions</a:t>
             </a:r>
           </a:p>
         </p:txBody>
@@ -4294,7 +4945,7 @@
     </p:spTree>
     <p:extLst>
       <p:ext uri="{BB962C8B-B14F-4D97-AF65-F5344CB8AC3E}">
-        <p14:creationId xmlns:p14="http://schemas.microsoft.com/office/powerpoint/2010/main" val="3044138840"/>
+        <p14:creationId xmlns:p14="http://schemas.microsoft.com/office/powerpoint/2010/main" val="235171135"/>
       </p:ext>
     </p:extLst>
   </p:cSld>
@@ -4326,7 +4977,7 @@
           <p:cNvPr id="2" name="Title 1">
             <a:extLst>
               <a:ext uri="{FF2B5EF4-FFF2-40B4-BE49-F238E27FC236}">
-                <a16:creationId xmlns:a16="http://schemas.microsoft.com/office/drawing/2014/main" id="{AD0CD5A1-0FF0-A037-81F2-56E2AE3D1711}"/>
+                <a16:creationId xmlns:a16="http://schemas.microsoft.com/office/drawing/2014/main" id="{7FDC10C1-7202-EA06-08A1-B8DEE9F0122F}"/>
               </a:ext>
             </a:extLst>
           </p:cNvPr>
@@ -4344,80 +4995,115 @@
           <a:p>
             <a:r>
               <a:rPr lang="en-US" dirty="0"/>
-              <a:t>During the Discussion</a:t>
-            </a:r>
-          </a:p>
-        </p:txBody>
-      </p:sp>
-      <p:sp>
-        <p:nvSpPr>
+              <a:t>Preliminary Review</a:t>
+            </a:r>
+          </a:p>
+        </p:txBody>
+      </p:sp>
+      <p:pic>
+        <p:nvPicPr>
           <p:cNvPr id="5" name="Content Placeholder 4">
             <a:extLst>
               <a:ext uri="{FF2B5EF4-FFF2-40B4-BE49-F238E27FC236}">
-                <a16:creationId xmlns:a16="http://schemas.microsoft.com/office/drawing/2014/main" id="{2C8118B6-A1D5-861D-FA44-4DA636810C49}"/>
-              </a:ext>
-            </a:extLst>
-          </p:cNvPr>
-          <p:cNvSpPr>
-            <a:spLocks noGrp="1"/>
-          </p:cNvSpPr>
-          <p:nvPr>
-            <p:ph idx="1"/>
-          </p:nvPr>
-        </p:nvSpPr>
-        <p:spPr/>
-        <p:txBody>
-          <a:bodyPr/>
-          <a:lstStyle/>
-          <a:p>
-            <a:r>
-              <a:rPr lang="en-US" dirty="0"/>
-              <a:t>Typically F30, F31 and F32 reviewed by same panel of 30-40</a:t>
-            </a:r>
-          </a:p>
-          <a:p>
-            <a:r>
-              <a:rPr lang="en-US" dirty="0"/>
-              <a:t>Conflicts </a:t>
-            </a:r>
-          </a:p>
-          <a:p>
-            <a:r>
-              <a:rPr lang="en-US" dirty="0"/>
-              <a:t>Applications will be assigned to three reviewers </a:t>
-            </a:r>
-          </a:p>
-          <a:p>
-            <a:r>
-              <a:rPr lang="en-US" dirty="0"/>
-              <a:t>Primary reviewer is most important</a:t>
+                <a16:creationId xmlns:a16="http://schemas.microsoft.com/office/drawing/2014/main" id="{1613FE4D-9E1A-B777-C4E7-44AD04E00A2D}"/>
+              </a:ext>
+            </a:extLst>
+          </p:cNvPr>
+          <p:cNvPicPr>
+            <a:picLocks noGrp="1" noChangeAspect="1"/>
+          </p:cNvPicPr>
+          <p:nvPr>
+            <p:ph sz="half" idx="1"/>
+          </p:nvPr>
+        </p:nvPicPr>
+        <p:blipFill>
+          <a:blip r:embed="rId2"/>
+          <a:stretch>
+            <a:fillRect/>
+          </a:stretch>
+        </p:blipFill>
+        <p:spPr>
+          <a:xfrm>
+            <a:off x="1320422" y="1825625"/>
+            <a:ext cx="4217155" cy="4351338"/>
+          </a:xfrm>
+        </p:spPr>
+      </p:pic>
+      <p:sp>
+        <p:nvSpPr>
+          <p:cNvPr id="9" name="Content Placeholder 8">
+            <a:extLst>
+              <a:ext uri="{FF2B5EF4-FFF2-40B4-BE49-F238E27FC236}">
+                <a16:creationId xmlns:a16="http://schemas.microsoft.com/office/drawing/2014/main" id="{3D370E9D-6F84-AE4E-D4AB-A3C02A6D5835}"/>
+              </a:ext>
+            </a:extLst>
+          </p:cNvPr>
+          <p:cNvSpPr>
+            <a:spLocks noGrp="1"/>
+          </p:cNvSpPr>
+          <p:nvPr>
+            <p:ph sz="half" idx="2"/>
+          </p:nvPr>
+        </p:nvSpPr>
+        <p:spPr/>
+        <p:txBody>
+          <a:bodyPr>
+            <a:normAutofit fontScale="92500" lnSpcReduction="20000"/>
+          </a:bodyPr>
+          <a:lstStyle/>
+          <a:p>
+            <a:r>
+              <a:rPr lang="en-US" dirty="0"/>
+              <a:t>Will be given score between 1 (excellent) and 9 on three categories</a:t>
+            </a:r>
+          </a:p>
+          <a:p>
+            <a:r>
+              <a:rPr lang="en-US" dirty="0"/>
+              <a:t>Overall score</a:t>
+            </a:r>
+          </a:p>
+          <a:p>
+            <a:r>
+              <a:rPr lang="en-US" dirty="0"/>
+              <a:t>Triage process</a:t>
+            </a:r>
+          </a:p>
+          <a:p>
+            <a:endParaRPr lang="en-US" dirty="0"/>
+          </a:p>
+          <a:p>
+            <a:r>
+              <a:rPr lang="en-US" dirty="0"/>
+              <a:t>Not scored</a:t>
             </a:r>
           </a:p>
           <a:p>
             <a:pPr lvl="1"/>
             <a:r>
               <a:rPr lang="en-US" dirty="0"/>
-              <a:t>Will introduce application, describe their evaluation ~15 mins</a:t>
+              <a:t>RCRS</a:t>
             </a:r>
           </a:p>
           <a:p>
             <a:pPr lvl="1"/>
             <a:r>
               <a:rPr lang="en-US" dirty="0"/>
-              <a:t>Secondary reviewers will add new points/clarify differences</a:t>
+              <a:t>Human subjects, vertebrate animals</a:t>
             </a:r>
           </a:p>
           <a:p>
             <a:pPr lvl="1"/>
             <a:r>
               <a:rPr lang="en-US" dirty="0"/>
-              <a:t>Rest of panel can ask questions</a:t>
-            </a:r>
-          </a:p>
-          <a:p>
-            <a:r>
-              <a:rPr lang="en-US" dirty="0"/>
-              <a:t>All panel members vote (weighted towards primary reviewers)</a:t>
+              <a:t>Budget</a:t>
+            </a:r>
+          </a:p>
+          <a:p>
+            <a:pPr lvl="1"/>
+            <a:r>
+              <a:rPr lang="en-US" dirty="0"/>
+              <a:t>Resource sharing</a:t>
             </a:r>
           </a:p>
         </p:txBody>
@@ -4425,7 +5111,7 @@
     </p:spTree>
     <p:extLst>
       <p:ext uri="{BB962C8B-B14F-4D97-AF65-F5344CB8AC3E}">
-        <p14:creationId xmlns:p14="http://schemas.microsoft.com/office/powerpoint/2010/main" val="3757340246"/>
+        <p14:creationId xmlns:p14="http://schemas.microsoft.com/office/powerpoint/2010/main" val="3044138840"/>
       </p:ext>
     </p:extLst>
   </p:cSld>
@@ -4457,7 +5143,7 @@
           <p:cNvPr id="2" name="Title 1">
             <a:extLst>
               <a:ext uri="{FF2B5EF4-FFF2-40B4-BE49-F238E27FC236}">
-                <a16:creationId xmlns:a16="http://schemas.microsoft.com/office/drawing/2014/main" id="{CD000CD2-8F33-03D2-EE83-6248C6D215F6}"/>
+                <a16:creationId xmlns:a16="http://schemas.microsoft.com/office/drawing/2014/main" id="{AD0CD5A1-0FF0-A037-81F2-56E2AE3D1711}"/>
               </a:ext>
             </a:extLst>
           </p:cNvPr>
@@ -4475,17 +5161,17 @@
           <a:p>
             <a:r>
               <a:rPr lang="en-US" dirty="0"/>
-              <a:t>After the Discussion</a:t>
-            </a:r>
-          </a:p>
-        </p:txBody>
-      </p:sp>
-      <p:sp>
-        <p:nvSpPr>
-          <p:cNvPr id="3" name="Content Placeholder 2">
-            <a:extLst>
-              <a:ext uri="{FF2B5EF4-FFF2-40B4-BE49-F238E27FC236}">
-                <a16:creationId xmlns:a16="http://schemas.microsoft.com/office/drawing/2014/main" id="{96ABFE7C-5D5D-715A-4373-9D592BF61F4B}"/>
+              <a:t>During the Discussion</a:t>
+            </a:r>
+          </a:p>
+        </p:txBody>
+      </p:sp>
+      <p:sp>
+        <p:nvSpPr>
+          <p:cNvPr id="5" name="Content Placeholder 4">
+            <a:extLst>
+              <a:ext uri="{FF2B5EF4-FFF2-40B4-BE49-F238E27FC236}">
+                <a16:creationId xmlns:a16="http://schemas.microsoft.com/office/drawing/2014/main" id="{2C8118B6-A1D5-861D-FA44-4DA636810C49}"/>
               </a:ext>
             </a:extLst>
           </p:cNvPr>
@@ -4503,46 +5189,52 @@
           <a:p>
             <a:r>
               <a:rPr lang="en-US" dirty="0"/>
-              <a:t>Reviewers strongly encouraged to update critiques</a:t>
-            </a:r>
-          </a:p>
-          <a:p>
-            <a:r>
-              <a:rPr lang="en-US" dirty="0"/>
-              <a:t>You will get a score between 10 (all 1s) and 90 (all 9s)</a:t>
-            </a:r>
-          </a:p>
-          <a:p>
-            <a:r>
-              <a:rPr lang="en-US" dirty="0"/>
-              <a:t>A couple weeks later you will get the written critiques</a:t>
-            </a:r>
-          </a:p>
-          <a:p>
-            <a:r>
-              <a:rPr lang="en-US" dirty="0"/>
-              <a:t>Current paylines not available, generally &lt;30 or &lt;30</a:t>
-            </a:r>
-            <a:r>
-              <a:rPr lang="en-US" baseline="30000" dirty="0"/>
-              <a:t>th</a:t>
-            </a:r>
-            <a:r>
-              <a:rPr lang="en-US" dirty="0"/>
-              <a:t> percentile</a:t>
+              <a:t>Typically F30, F31 and F32 reviewed by same panel of 30-40</a:t>
+            </a:r>
+          </a:p>
+          <a:p>
+            <a:r>
+              <a:rPr lang="en-US" dirty="0"/>
+              <a:t>Conflicts </a:t>
+            </a:r>
+          </a:p>
+          <a:p>
+            <a:r>
+              <a:rPr lang="en-US" dirty="0"/>
+              <a:t>Applications will be assigned to three reviewers </a:t>
+            </a:r>
+          </a:p>
+          <a:p>
+            <a:r>
+              <a:rPr lang="en-US" dirty="0"/>
+              <a:t>Primary reviewer is most important</a:t>
             </a:r>
           </a:p>
           <a:p>
             <a:pPr lvl="1"/>
             <a:r>
               <a:rPr lang="en-US" dirty="0"/>
-              <a:t>Usually, institutes publish these, currently not available</a:t>
-            </a:r>
-          </a:p>
-          <a:p>
-            <a:r>
-              <a:rPr lang="en-US" dirty="0"/>
-              <a:t>Your PO may ask for clarifications or a response to critiques</a:t>
+              <a:t>Will introduce application, describe their evaluation ~15 mins</a:t>
+            </a:r>
+          </a:p>
+          <a:p>
+            <a:pPr lvl="1"/>
+            <a:r>
+              <a:rPr lang="en-US" dirty="0"/>
+              <a:t>Secondary reviewers will add new points/clarify differences</a:t>
+            </a:r>
+          </a:p>
+          <a:p>
+            <a:pPr lvl="1"/>
+            <a:r>
+              <a:rPr lang="en-US" dirty="0"/>
+              <a:t>Rest of panel can ask questions</a:t>
+            </a:r>
+          </a:p>
+          <a:p>
+            <a:r>
+              <a:rPr lang="en-US" dirty="0"/>
+              <a:t>All panel members vote (weighted towards primary reviewers)</a:t>
             </a:r>
           </a:p>
         </p:txBody>
@@ -4550,7 +5242,7 @@
     </p:spTree>
     <p:extLst>
       <p:ext uri="{BB962C8B-B14F-4D97-AF65-F5344CB8AC3E}">
-        <p14:creationId xmlns:p14="http://schemas.microsoft.com/office/powerpoint/2010/main" val="31329508"/>
+        <p14:creationId xmlns:p14="http://schemas.microsoft.com/office/powerpoint/2010/main" val="3757340246"/>
       </p:ext>
     </p:extLst>
   </p:cSld>
@@ -4873,4 +5565,319 @@
     </a:ext>
   </a:extLst>
 </a:theme>
+</file>
+
+<file path=ppt/theme/theme2.xml><?xml version="1.0" encoding="utf-8"?>
+<a:theme xmlns:a="http://schemas.openxmlformats.org/drawingml/2006/main" name="Office Theme">
+  <a:themeElements>
+    <a:clrScheme name="Office">
+      <a:dk1>
+        <a:sysClr val="windowText" lastClr="000000"/>
+      </a:dk1>
+      <a:lt1>
+        <a:sysClr val="window" lastClr="FFFFFF"/>
+      </a:lt1>
+      <a:dk2>
+        <a:srgbClr val="0E2841"/>
+      </a:dk2>
+      <a:lt2>
+        <a:srgbClr val="E8E8E8"/>
+      </a:lt2>
+      <a:accent1>
+        <a:srgbClr val="156082"/>
+      </a:accent1>
+      <a:accent2>
+        <a:srgbClr val="E97132"/>
+      </a:accent2>
+      <a:accent3>
+        <a:srgbClr val="196B24"/>
+      </a:accent3>
+      <a:accent4>
+        <a:srgbClr val="0F9ED5"/>
+      </a:accent4>
+      <a:accent5>
+        <a:srgbClr val="A02B93"/>
+      </a:accent5>
+      <a:accent6>
+        <a:srgbClr val="4EA72E"/>
+      </a:accent6>
+      <a:hlink>
+        <a:srgbClr val="467886"/>
+      </a:hlink>
+      <a:folHlink>
+        <a:srgbClr val="96607D"/>
+      </a:folHlink>
+    </a:clrScheme>
+    <a:fontScheme name="Office">
+      <a:majorFont>
+        <a:latin typeface="Aptos Display" panose="02110004020202020204"/>
+        <a:ea typeface=""/>
+        <a:cs typeface=""/>
+        <a:font script="Jpan" typeface="游ゴシック Light"/>
+        <a:font script="Hang" typeface="맑은 고딕"/>
+        <a:font script="Hans" typeface="等线 Light"/>
+        <a:font script="Hant" typeface="新細明體"/>
+        <a:font script="Arab" typeface="Times New Roman"/>
+        <a:font script="Hebr" typeface="Times New Roman"/>
+        <a:font script="Thai" typeface="Angsana New"/>
+        <a:font script="Ethi" typeface="Nyala"/>
+        <a:font script="Beng" typeface="Vrinda"/>
+        <a:font script="Gujr" typeface="Shruti"/>
+        <a:font script="Khmr" typeface="MoolBoran"/>
+        <a:font script="Knda" typeface="Tunga"/>
+        <a:font script="Guru" typeface="Raavi"/>
+        <a:font script="Cans" typeface="Euphemia"/>
+        <a:font script="Cher" typeface="Plantagenet Cherokee"/>
+        <a:font script="Yiii" typeface="Microsoft Yi Baiti"/>
+        <a:font script="Tibt" typeface="Microsoft Himalaya"/>
+        <a:font script="Thaa" typeface="MV Boli"/>
+        <a:font script="Deva" typeface="Mangal"/>
+        <a:font script="Telu" typeface="Gautami"/>
+        <a:font script="Taml" typeface="Latha"/>
+        <a:font script="Syrc" typeface="Estrangelo Edessa"/>
+        <a:font script="Orya" typeface="Kalinga"/>
+        <a:font script="Mlym" typeface="Kartika"/>
+        <a:font script="Laoo" typeface="DokChampa"/>
+        <a:font script="Sinh" typeface="Iskoola Pota"/>
+        <a:font script="Mong" typeface="Mongolian Baiti"/>
+        <a:font script="Viet" typeface="Times New Roman"/>
+        <a:font script="Uigh" typeface="Microsoft Uighur"/>
+        <a:font script="Geor" typeface="Sylfaen"/>
+        <a:font script="Armn" typeface="Arial"/>
+        <a:font script="Bugi" typeface="Leelawadee UI"/>
+        <a:font script="Bopo" typeface="Microsoft JhengHei"/>
+        <a:font script="Java" typeface="Javanese Text"/>
+        <a:font script="Lisu" typeface="Segoe UI"/>
+        <a:font script="Mymr" typeface="Myanmar Text"/>
+        <a:font script="Nkoo" typeface="Ebrima"/>
+        <a:font script="Olck" typeface="Nirmala UI"/>
+        <a:font script="Osma" typeface="Ebrima"/>
+        <a:font script="Phag" typeface="Phagspa"/>
+        <a:font script="Syrn" typeface="Estrangelo Edessa"/>
+        <a:font script="Syrj" typeface="Estrangelo Edessa"/>
+        <a:font script="Syre" typeface="Estrangelo Edessa"/>
+        <a:font script="Sora" typeface="Nirmala UI"/>
+        <a:font script="Tale" typeface="Microsoft Tai Le"/>
+        <a:font script="Talu" typeface="Microsoft New Tai Lue"/>
+        <a:font script="Tfng" typeface="Ebrima"/>
+      </a:majorFont>
+      <a:minorFont>
+        <a:latin typeface="Aptos" panose="02110004020202020204"/>
+        <a:ea typeface=""/>
+        <a:cs typeface=""/>
+        <a:font script="Jpan" typeface="游ゴシック"/>
+        <a:font script="Hang" typeface="맑은 고딕"/>
+        <a:font script="Hans" typeface="等线"/>
+        <a:font script="Hant" typeface="新細明體"/>
+        <a:font script="Arab" typeface="Arial"/>
+        <a:font script="Hebr" typeface="Arial"/>
+        <a:font script="Thai" typeface="Cordia New"/>
+        <a:font script="Ethi" typeface="Nyala"/>
+        <a:font script="Beng" typeface="Vrinda"/>
+        <a:font script="Gujr" typeface="Shruti"/>
+        <a:font script="Khmr" typeface="DaunPenh"/>
+        <a:font script="Knda" typeface="Tunga"/>
+        <a:font script="Guru" typeface="Raavi"/>
+        <a:font script="Cans" typeface="Euphemia"/>
+        <a:font script="Cher" typeface="Plantagenet Cherokee"/>
+        <a:font script="Yiii" typeface="Microsoft Yi Baiti"/>
+        <a:font script="Tibt" typeface="Microsoft Himalaya"/>
+        <a:font script="Thaa" typeface="MV Boli"/>
+        <a:font script="Deva" typeface="Mangal"/>
+        <a:font script="Telu" typeface="Gautami"/>
+        <a:font script="Taml" typeface="Latha"/>
+        <a:font script="Syrc" typeface="Estrangelo Edessa"/>
+        <a:font script="Orya" typeface="Kalinga"/>
+        <a:font script="Mlym" typeface="Kartika"/>
+        <a:font script="Laoo" typeface="DokChampa"/>
+        <a:font script="Sinh" typeface="Iskoola Pota"/>
+        <a:font script="Mong" typeface="Mongolian Baiti"/>
+        <a:font script="Viet" typeface="Arial"/>
+        <a:font script="Uigh" typeface="Microsoft Uighur"/>
+        <a:font script="Geor" typeface="Sylfaen"/>
+        <a:font script="Armn" typeface="Arial"/>
+        <a:font script="Bugi" typeface="Leelawadee UI"/>
+        <a:font script="Bopo" typeface="Microsoft JhengHei"/>
+        <a:font script="Java" typeface="Javanese Text"/>
+        <a:font script="Lisu" typeface="Segoe UI"/>
+        <a:font script="Mymr" typeface="Myanmar Text"/>
+        <a:font script="Nkoo" typeface="Ebrima"/>
+        <a:font script="Olck" typeface="Nirmala UI"/>
+        <a:font script="Osma" typeface="Ebrima"/>
+        <a:font script="Phag" typeface="Phagspa"/>
+        <a:font script="Syrn" typeface="Estrangelo Edessa"/>
+        <a:font script="Syrj" typeface="Estrangelo Edessa"/>
+        <a:font script="Syre" typeface="Estrangelo Edessa"/>
+        <a:font script="Sora" typeface="Nirmala UI"/>
+        <a:font script="Tale" typeface="Microsoft Tai Le"/>
+        <a:font script="Talu" typeface="Microsoft New Tai Lue"/>
+        <a:font script="Tfng" typeface="Ebrima"/>
+      </a:minorFont>
+    </a:fontScheme>
+    <a:fmtScheme name="Office">
+      <a:fillStyleLst>
+        <a:solidFill>
+          <a:schemeClr val="phClr"/>
+        </a:solidFill>
+        <a:gradFill rotWithShape="1">
+          <a:gsLst>
+            <a:gs pos="0">
+              <a:schemeClr val="phClr">
+                <a:lumMod val="110000"/>
+                <a:satMod val="105000"/>
+                <a:tint val="67000"/>
+              </a:schemeClr>
+            </a:gs>
+            <a:gs pos="50000">
+              <a:schemeClr val="phClr">
+                <a:lumMod val="105000"/>
+                <a:satMod val="103000"/>
+                <a:tint val="73000"/>
+              </a:schemeClr>
+            </a:gs>
+            <a:gs pos="100000">
+              <a:schemeClr val="phClr">
+                <a:lumMod val="105000"/>
+                <a:satMod val="109000"/>
+                <a:tint val="81000"/>
+              </a:schemeClr>
+            </a:gs>
+          </a:gsLst>
+          <a:lin ang="5400000" scaled="0"/>
+        </a:gradFill>
+        <a:gradFill rotWithShape="1">
+          <a:gsLst>
+            <a:gs pos="0">
+              <a:schemeClr val="phClr">
+                <a:satMod val="103000"/>
+                <a:lumMod val="102000"/>
+                <a:tint val="94000"/>
+              </a:schemeClr>
+            </a:gs>
+            <a:gs pos="50000">
+              <a:schemeClr val="phClr">
+                <a:satMod val="110000"/>
+                <a:lumMod val="100000"/>
+                <a:shade val="100000"/>
+              </a:schemeClr>
+            </a:gs>
+            <a:gs pos="100000">
+              <a:schemeClr val="phClr">
+                <a:lumMod val="99000"/>
+                <a:satMod val="120000"/>
+                <a:shade val="78000"/>
+              </a:schemeClr>
+            </a:gs>
+          </a:gsLst>
+          <a:lin ang="5400000" scaled="0"/>
+        </a:gradFill>
+      </a:fillStyleLst>
+      <a:lnStyleLst>
+        <a:ln w="12700" cap="flat" cmpd="sng" algn="ctr">
+          <a:solidFill>
+            <a:schemeClr val="phClr"/>
+          </a:solidFill>
+          <a:prstDash val="solid"/>
+          <a:miter lim="800000"/>
+        </a:ln>
+        <a:ln w="19050" cap="flat" cmpd="sng" algn="ctr">
+          <a:solidFill>
+            <a:schemeClr val="phClr"/>
+          </a:solidFill>
+          <a:prstDash val="solid"/>
+          <a:miter lim="800000"/>
+        </a:ln>
+        <a:ln w="25400" cap="flat" cmpd="sng" algn="ctr">
+          <a:solidFill>
+            <a:schemeClr val="phClr"/>
+          </a:solidFill>
+          <a:prstDash val="solid"/>
+          <a:miter lim="800000"/>
+        </a:ln>
+      </a:lnStyleLst>
+      <a:effectStyleLst>
+        <a:effectStyle>
+          <a:effectLst/>
+        </a:effectStyle>
+        <a:effectStyle>
+          <a:effectLst/>
+        </a:effectStyle>
+        <a:effectStyle>
+          <a:effectLst>
+            <a:outerShdw blurRad="57150" dist="19050" dir="5400000" algn="ctr" rotWithShape="0">
+              <a:srgbClr val="000000">
+                <a:alpha val="63000"/>
+              </a:srgbClr>
+            </a:outerShdw>
+          </a:effectLst>
+        </a:effectStyle>
+      </a:effectStyleLst>
+      <a:bgFillStyleLst>
+        <a:solidFill>
+          <a:schemeClr val="phClr"/>
+        </a:solidFill>
+        <a:solidFill>
+          <a:schemeClr val="phClr">
+            <a:tint val="95000"/>
+            <a:satMod val="170000"/>
+          </a:schemeClr>
+        </a:solidFill>
+        <a:gradFill rotWithShape="1">
+          <a:gsLst>
+            <a:gs pos="0">
+              <a:schemeClr val="phClr">
+                <a:tint val="93000"/>
+                <a:satMod val="150000"/>
+                <a:shade val="98000"/>
+                <a:lumMod val="102000"/>
+              </a:schemeClr>
+            </a:gs>
+            <a:gs pos="50000">
+              <a:schemeClr val="phClr">
+                <a:tint val="98000"/>
+                <a:satMod val="130000"/>
+                <a:shade val="90000"/>
+                <a:lumMod val="103000"/>
+              </a:schemeClr>
+            </a:gs>
+            <a:gs pos="100000">
+              <a:schemeClr val="phClr">
+                <a:shade val="63000"/>
+                <a:satMod val="120000"/>
+              </a:schemeClr>
+            </a:gs>
+          </a:gsLst>
+          <a:lin ang="5400000" scaled="0"/>
+        </a:gradFill>
+      </a:bgFillStyleLst>
+    </a:fmtScheme>
+  </a:themeElements>
+  <a:objectDefaults>
+    <a:lnDef>
+      <a:spPr/>
+      <a:bodyPr/>
+      <a:lstStyle/>
+      <a:style>
+        <a:lnRef idx="2">
+          <a:schemeClr val="accent1"/>
+        </a:lnRef>
+        <a:fillRef idx="0">
+          <a:schemeClr val="accent1"/>
+        </a:fillRef>
+        <a:effectRef idx="1">
+          <a:schemeClr val="accent1"/>
+        </a:effectRef>
+        <a:fontRef idx="minor">
+          <a:schemeClr val="tx1"/>
+        </a:fontRef>
+      </a:style>
+    </a:lnDef>
+  </a:objectDefaults>
+  <a:extraClrSchemeLst/>
+  <a:extLst>
+    <a:ext uri="{05A4C25C-085E-4340-85A3-A5531E510DB2}">
+      <thm15:themeFamily xmlns:thm15="http://schemas.microsoft.com/office/thememl/2012/main" name="Office Theme" id="{2E142A2C-CD16-42D6-873A-C26D2A0506FA}" vid="{1BDDFF52-6CD6-40A5-AB3C-68EB2F1E4D0A}"/>
+    </a:ext>
+  </a:extLst>
+</a:theme>
 </file>
</xml_diff>